<commit_message>
Updated SDPi Profiles Diagram
Per Issue #276 tf-1 Figure 2.3.1-1 Text & Arrows
</commit_message>
<xml_diff>
--- a/SDPi_Supplement/sources/vol1-diagram-sdpi-profiles.pptx
+++ b/SDPi_Supplement/sources/vol1-diagram-sdpi-profiles.pptx
@@ -259,7 +259,7 @@
           <a:p>
             <a:fld id="{CEAB79FE-F2B8-4F38-B4B7-E17A89FC2611}" type="datetimeFigureOut">
               <a:rPr lang="en-US" smtClean="0"/>
-              <a:t>11/2/2022</a:t>
+              <a:t>1/27/2023</a:t>
             </a:fld>
             <a:endParaRPr lang="en-US"/>
           </a:p>
@@ -457,7 +457,7 @@
           <a:p>
             <a:fld id="{CEAB79FE-F2B8-4F38-B4B7-E17A89FC2611}" type="datetimeFigureOut">
               <a:rPr lang="en-US" smtClean="0"/>
-              <a:t>11/2/2022</a:t>
+              <a:t>1/27/2023</a:t>
             </a:fld>
             <a:endParaRPr lang="en-US"/>
           </a:p>
@@ -665,7 +665,7 @@
           <a:p>
             <a:fld id="{CEAB79FE-F2B8-4F38-B4B7-E17A89FC2611}" type="datetimeFigureOut">
               <a:rPr lang="en-US" smtClean="0"/>
-              <a:t>11/2/2022</a:t>
+              <a:t>1/27/2023</a:t>
             </a:fld>
             <a:endParaRPr lang="en-US"/>
           </a:p>
@@ -863,7 +863,7 @@
           <a:p>
             <a:fld id="{CEAB79FE-F2B8-4F38-B4B7-E17A89FC2611}" type="datetimeFigureOut">
               <a:rPr lang="en-US" smtClean="0"/>
-              <a:t>11/2/2022</a:t>
+              <a:t>1/27/2023</a:t>
             </a:fld>
             <a:endParaRPr lang="en-US"/>
           </a:p>
@@ -1138,7 +1138,7 @@
           <a:p>
             <a:fld id="{CEAB79FE-F2B8-4F38-B4B7-E17A89FC2611}" type="datetimeFigureOut">
               <a:rPr lang="en-US" smtClean="0"/>
-              <a:t>11/2/2022</a:t>
+              <a:t>1/27/2023</a:t>
             </a:fld>
             <a:endParaRPr lang="en-US"/>
           </a:p>
@@ -1403,7 +1403,7 @@
           <a:p>
             <a:fld id="{CEAB79FE-F2B8-4F38-B4B7-E17A89FC2611}" type="datetimeFigureOut">
               <a:rPr lang="en-US" smtClean="0"/>
-              <a:t>11/2/2022</a:t>
+              <a:t>1/27/2023</a:t>
             </a:fld>
             <a:endParaRPr lang="en-US"/>
           </a:p>
@@ -1815,7 +1815,7 @@
           <a:p>
             <a:fld id="{CEAB79FE-F2B8-4F38-B4B7-E17A89FC2611}" type="datetimeFigureOut">
               <a:rPr lang="en-US" smtClean="0"/>
-              <a:t>11/2/2022</a:t>
+              <a:t>1/27/2023</a:t>
             </a:fld>
             <a:endParaRPr lang="en-US"/>
           </a:p>
@@ -1956,7 +1956,7 @@
           <a:p>
             <a:fld id="{CEAB79FE-F2B8-4F38-B4B7-E17A89FC2611}" type="datetimeFigureOut">
               <a:rPr lang="en-US" smtClean="0"/>
-              <a:t>11/2/2022</a:t>
+              <a:t>1/27/2023</a:t>
             </a:fld>
             <a:endParaRPr lang="en-US"/>
           </a:p>
@@ -2069,7 +2069,7 @@
           <a:p>
             <a:fld id="{CEAB79FE-F2B8-4F38-B4B7-E17A89FC2611}" type="datetimeFigureOut">
               <a:rPr lang="en-US" smtClean="0"/>
-              <a:t>11/2/2022</a:t>
+              <a:t>1/27/2023</a:t>
             </a:fld>
             <a:endParaRPr lang="en-US"/>
           </a:p>
@@ -2380,7 +2380,7 @@
           <a:p>
             <a:fld id="{CEAB79FE-F2B8-4F38-B4B7-E17A89FC2611}" type="datetimeFigureOut">
               <a:rPr lang="en-US" smtClean="0"/>
-              <a:t>11/2/2022</a:t>
+              <a:t>1/27/2023</a:t>
             </a:fld>
             <a:endParaRPr lang="en-US"/>
           </a:p>
@@ -2668,7 +2668,7 @@
           <a:p>
             <a:fld id="{CEAB79FE-F2B8-4F38-B4B7-E17A89FC2611}" type="datetimeFigureOut">
               <a:rPr lang="en-US" smtClean="0"/>
-              <a:t>11/2/2022</a:t>
+              <a:t>1/27/2023</a:t>
             </a:fld>
             <a:endParaRPr lang="en-US"/>
           </a:p>
@@ -2909,7 +2909,7 @@
           <a:p>
             <a:fld id="{CEAB79FE-F2B8-4F38-B4B7-E17A89FC2611}" type="datetimeFigureOut">
               <a:rPr lang="en-US" smtClean="0"/>
-              <a:t>11/2/2022</a:t>
+              <a:t>1/27/2023</a:t>
             </a:fld>
             <a:endParaRPr lang="en-US"/>
           </a:p>
@@ -3717,15 +3717,14 @@
           </p:cNvPr>
           <p:cNvCxnSpPr>
             <a:cxnSpLocks/>
-            <a:stCxn id="4" idx="2"/>
             <a:endCxn id="5" idx="0"/>
           </p:cNvCxnSpPr>
           <p:nvPr/>
         </p:nvCxnSpPr>
         <p:spPr>
           <a:xfrm>
-            <a:off x="6095999" y="2584207"/>
-            <a:ext cx="2188415" cy="501993"/>
+            <a:off x="7479587" y="2584207"/>
+            <a:ext cx="804827" cy="501993"/>
           </a:xfrm>
           <a:prstGeom prst="straightConnector1">
             <a:avLst/>
@@ -3734,7 +3733,8 @@
             <a:solidFill>
               <a:schemeClr val="bg1"/>
             </a:solidFill>
-            <a:tailEnd type="triangle"/>
+            <a:headEnd type="triangle" w="med" len="med"/>
+            <a:tailEnd type="none" w="med" len="med"/>
           </a:ln>
         </p:spPr>
         <p:style>
@@ -3780,7 +3780,8 @@
             <a:solidFill>
               <a:schemeClr val="bg1"/>
             </a:solidFill>
-            <a:tailEnd type="triangle"/>
+            <a:headEnd type="triangle" w="med" len="med"/>
+            <a:tailEnd type="none" w="med" len="med"/>
           </a:ln>
         </p:spPr>
         <p:style>
@@ -3809,7 +3810,6 @@
           </p:cNvPr>
           <p:cNvCxnSpPr>
             <a:cxnSpLocks/>
-            <a:stCxn id="4" idx="2"/>
             <a:endCxn id="6" idx="0"/>
           </p:cNvCxnSpPr>
           <p:nvPr/>
@@ -3817,7 +3817,7 @@
         <p:spPr>
           <a:xfrm flipH="1">
             <a:off x="3909483" y="2584207"/>
-            <a:ext cx="2186516" cy="482628"/>
+            <a:ext cx="811492" cy="482628"/>
           </a:xfrm>
           <a:prstGeom prst="straightConnector1">
             <a:avLst/>
@@ -3826,7 +3826,8 @@
             <a:solidFill>
               <a:schemeClr val="bg1"/>
             </a:solidFill>
-            <a:tailEnd type="triangle"/>
+            <a:headEnd type="triangle" w="med" len="med"/>
+            <a:tailEnd type="none" w="med" len="med"/>
           </a:ln>
         </p:spPr>
         <p:style>

</xml_diff>